<commit_message>
add images to 7
</commit_message>
<xml_diff>
--- a/Week 7/Workshop/Week7_Hour2.pptx
+++ b/Week 7/Workshop/Week7_Hour2.pptx
@@ -5,16 +5,17 @@
     <p:sldMasterId id="2147483648" r:id="rId4"/>
   </p:sldMasterIdLst>
   <p:notesMasterIdLst>
-    <p:notesMasterId r:id="rId12"/>
+    <p:notesMasterId r:id="rId13"/>
   </p:notesMasterIdLst>
   <p:sldIdLst>
     <p:sldId id="256" r:id="rId5"/>
-    <p:sldId id="257" r:id="rId6"/>
-    <p:sldId id="258" r:id="rId7"/>
-    <p:sldId id="259" r:id="rId8"/>
-    <p:sldId id="260" r:id="rId9"/>
-    <p:sldId id="261" r:id="rId10"/>
-    <p:sldId id="262" r:id="rId11"/>
+    <p:sldId id="263" r:id="rId6"/>
+    <p:sldId id="257" r:id="rId7"/>
+    <p:sldId id="258" r:id="rId8"/>
+    <p:sldId id="259" r:id="rId9"/>
+    <p:sldId id="260" r:id="rId10"/>
+    <p:sldId id="261" r:id="rId11"/>
+    <p:sldId id="262" r:id="rId12"/>
   </p:sldIdLst>
   <p:sldSz cx="12192000" cy="6858000"/>
   <p:notesSz cx="6858000" cy="9144000"/>
@@ -214,7 +215,7 @@
           <a:p>
             <a:fld id="{3AE1363B-A753-A34A-8038-3713A8DDA4AC}" type="datetimeFigureOut">
               <a:rPr lang="en-US" smtClean="0"/>
-              <a:t>3/13/2023</a:t>
+              <a:t>3/14/2023</a:t>
             </a:fld>
             <a:endParaRPr lang="en-US"/>
           </a:p>
@@ -631,7 +632,7 @@
           <a:p>
             <a:fld id="{BB5DF815-128E-7246-9FA9-1C96BD5D98A4}" type="datetimeFigureOut">
               <a:rPr lang="en-US" smtClean="0"/>
-              <a:t>3/13/2023</a:t>
+              <a:t>3/14/2023</a:t>
             </a:fld>
             <a:endParaRPr lang="en-US"/>
           </a:p>
@@ -831,7 +832,7 @@
           <a:p>
             <a:fld id="{BB5DF815-128E-7246-9FA9-1C96BD5D98A4}" type="datetimeFigureOut">
               <a:rPr lang="en-US" smtClean="0"/>
-              <a:t>3/13/2023</a:t>
+              <a:t>3/14/2023</a:t>
             </a:fld>
             <a:endParaRPr lang="en-US"/>
           </a:p>
@@ -1041,7 +1042,7 @@
           <a:p>
             <a:fld id="{BB5DF815-128E-7246-9FA9-1C96BD5D98A4}" type="datetimeFigureOut">
               <a:rPr lang="en-US" smtClean="0"/>
-              <a:t>3/13/2023</a:t>
+              <a:t>3/14/2023</a:t>
             </a:fld>
             <a:endParaRPr lang="en-US"/>
           </a:p>
@@ -1241,7 +1242,7 @@
           <a:p>
             <a:fld id="{BB5DF815-128E-7246-9FA9-1C96BD5D98A4}" type="datetimeFigureOut">
               <a:rPr lang="en-US" smtClean="0"/>
-              <a:t>3/13/2023</a:t>
+              <a:t>3/14/2023</a:t>
             </a:fld>
             <a:endParaRPr lang="en-US"/>
           </a:p>
@@ -1517,7 +1518,7 @@
           <a:p>
             <a:fld id="{BB5DF815-128E-7246-9FA9-1C96BD5D98A4}" type="datetimeFigureOut">
               <a:rPr lang="en-US" smtClean="0"/>
-              <a:t>3/13/2023</a:t>
+              <a:t>3/14/2023</a:t>
             </a:fld>
             <a:endParaRPr lang="en-US"/>
           </a:p>
@@ -1785,7 +1786,7 @@
           <a:p>
             <a:fld id="{BB5DF815-128E-7246-9FA9-1C96BD5D98A4}" type="datetimeFigureOut">
               <a:rPr lang="en-US" smtClean="0"/>
-              <a:t>3/13/2023</a:t>
+              <a:t>3/14/2023</a:t>
             </a:fld>
             <a:endParaRPr lang="en-US"/>
           </a:p>
@@ -2200,7 +2201,7 @@
           <a:p>
             <a:fld id="{BB5DF815-128E-7246-9FA9-1C96BD5D98A4}" type="datetimeFigureOut">
               <a:rPr lang="en-US" smtClean="0"/>
-              <a:t>3/13/2023</a:t>
+              <a:t>3/14/2023</a:t>
             </a:fld>
             <a:endParaRPr lang="en-US"/>
           </a:p>
@@ -2342,7 +2343,7 @@
           <a:p>
             <a:fld id="{BB5DF815-128E-7246-9FA9-1C96BD5D98A4}" type="datetimeFigureOut">
               <a:rPr lang="en-US" smtClean="0"/>
-              <a:t>3/13/2023</a:t>
+              <a:t>3/14/2023</a:t>
             </a:fld>
             <a:endParaRPr lang="en-US"/>
           </a:p>
@@ -2455,7 +2456,7 @@
           <a:p>
             <a:fld id="{BB5DF815-128E-7246-9FA9-1C96BD5D98A4}" type="datetimeFigureOut">
               <a:rPr lang="en-US" smtClean="0"/>
-              <a:t>3/13/2023</a:t>
+              <a:t>3/14/2023</a:t>
             </a:fld>
             <a:endParaRPr lang="en-US"/>
           </a:p>
@@ -2768,7 +2769,7 @@
           <a:p>
             <a:fld id="{BB5DF815-128E-7246-9FA9-1C96BD5D98A4}" type="datetimeFigureOut">
               <a:rPr lang="en-US" smtClean="0"/>
-              <a:t>3/13/2023</a:t>
+              <a:t>3/14/2023</a:t>
             </a:fld>
             <a:endParaRPr lang="en-US"/>
           </a:p>
@@ -3057,7 +3058,7 @@
           <a:p>
             <a:fld id="{BB5DF815-128E-7246-9FA9-1C96BD5D98A4}" type="datetimeFigureOut">
               <a:rPr lang="en-US" smtClean="0"/>
-              <a:t>3/13/2023</a:t>
+              <a:t>3/14/2023</a:t>
             </a:fld>
             <a:endParaRPr lang="en-US"/>
           </a:p>
@@ -3300,7 +3301,7 @@
           <a:p>
             <a:fld id="{BB5DF815-128E-7246-9FA9-1C96BD5D98A4}" type="datetimeFigureOut">
               <a:rPr lang="en-US" smtClean="0"/>
-              <a:t>3/13/2023</a:t>
+              <a:t>3/14/2023</a:t>
             </a:fld>
             <a:endParaRPr lang="en-US"/>
           </a:p>
@@ -5284,7 +5285,7 @@
           <p:cNvPr id="2" name="Title 1">
             <a:extLst>
               <a:ext uri="{FF2B5EF4-FFF2-40B4-BE49-F238E27FC236}">
-                <a16:creationId xmlns:a16="http://schemas.microsoft.com/office/drawing/2014/main" id="{5D82EFF9-F23E-F996-66F6-0B43DAA1A39F}"/>
+                <a16:creationId xmlns:a16="http://schemas.microsoft.com/office/drawing/2014/main" id="{5638C4E5-B35F-1864-C719-3029F5892D0C}"/>
               </a:ext>
             </a:extLst>
           </p:cNvPr>
@@ -5302,7 +5303,7 @@
           <a:p>
             <a:r>
               <a:rPr lang="en-US" dirty="0"/>
-              <a:t>‘Fake example using real publication’</a:t>
+              <a:t>Learning Outcomes</a:t>
             </a:r>
             <a:endParaRPr lang="en-GB" dirty="0"/>
           </a:p>
@@ -5313,7 +5314,7 @@
           <p:cNvPr id="3" name="Content Placeholder 2">
             <a:extLst>
               <a:ext uri="{FF2B5EF4-FFF2-40B4-BE49-F238E27FC236}">
-                <a16:creationId xmlns:a16="http://schemas.microsoft.com/office/drawing/2014/main" id="{756671E1-0A7C-76B9-ADD7-218778586A19}"/>
+                <a16:creationId xmlns:a16="http://schemas.microsoft.com/office/drawing/2014/main" id="{92F4DB7E-2107-1F6D-78DF-7838DF386A6F}"/>
               </a:ext>
             </a:extLst>
           </p:cNvPr>
@@ -5331,23 +5332,267 @@
           <a:p>
             <a:r>
               <a:rPr lang="en-US" dirty="0"/>
+              <a:t>Be able to locate and interpret validity evidence</a:t>
+            </a:r>
+          </a:p>
+          <a:p>
+            <a:r>
+              <a:rPr lang="en-US" dirty="0"/>
+              <a:t>Be able to apply validity evidence to link measured to unmeasured variables</a:t>
+            </a:r>
+            <a:endParaRPr lang="en-GB" dirty="0"/>
+          </a:p>
+        </p:txBody>
+      </p:sp>
+    </p:spTree>
+    <p:extLst>
+      <p:ext uri="{BB962C8B-B14F-4D97-AF65-F5344CB8AC3E}">
+        <p14:creationId xmlns:p14="http://schemas.microsoft.com/office/powerpoint/2010/main" val="4158108263"/>
+      </p:ext>
+    </p:extLst>
+  </p:cSld>
+  <p:clrMapOvr>
+    <a:masterClrMapping/>
+  </p:clrMapOvr>
+</p:sld>
+</file>
+
+<file path=ppt/slides/slide3.xml><?xml version="1.0" encoding="utf-8"?>
+<p:sld xmlns:a="http://schemas.openxmlformats.org/drawingml/2006/main" xmlns:r="http://schemas.openxmlformats.org/officeDocument/2006/relationships" xmlns:p="http://schemas.openxmlformats.org/presentationml/2006/main">
+  <p:cSld>
+    <p:bg>
+      <p:bgPr>
+        <a:solidFill>
+          <a:schemeClr val="bg1"/>
+        </a:solidFill>
+        <a:effectLst/>
+      </p:bgPr>
+    </p:bg>
+    <p:spTree>
+      <p:nvGrpSpPr>
+        <p:cNvPr id="1" name=""/>
+        <p:cNvGrpSpPr/>
+        <p:nvPr/>
+      </p:nvGrpSpPr>
+      <p:grpSpPr>
+        <a:xfrm>
+          <a:off x="0" y="0"/>
+          <a:ext cx="0" cy="0"/>
+          <a:chOff x="0" y="0"/>
+          <a:chExt cx="0" cy="0"/>
+        </a:xfrm>
+      </p:grpSpPr>
+      <p:sp useBgFill="1">
+        <p:nvSpPr>
+          <p:cNvPr id="10" name="Rectangle 9">
+            <a:extLst>
+              <a:ext uri="{FF2B5EF4-FFF2-40B4-BE49-F238E27FC236}">
+                <a16:creationId xmlns:a16="http://schemas.microsoft.com/office/drawing/2014/main" id="{B95B9BA8-1D69-4796-85F5-B6D0BD52354B}"/>
+              </a:ext>
+              <a:ext uri="{C183D7F6-B498-43B3-948B-1728B52AA6E4}">
+                <adec:decorative xmlns:adec="http://schemas.microsoft.com/office/drawing/2017/decorative" val="1"/>
+              </a:ext>
+            </a:extLst>
+          </p:cNvPr>
+          <p:cNvSpPr>
+            <a:spLocks noGrp="1" noRot="1" noChangeAspect="1" noMove="1" noResize="1" noEditPoints="1" noAdjustHandles="1" noChangeArrowheads="1" noChangeShapeType="1" noTextEdit="1"/>
+          </p:cNvSpPr>
+          <p:nvPr>
+            <p:extLst>
+              <p:ext uri="{386F3935-93C4-4BCD-93E2-E3B085C9AB24}">
+                <p16:designElem xmlns:p16="http://schemas.microsoft.com/office/powerpoint/2015/main" val="1"/>
+              </p:ext>
+            </p:extLst>
+          </p:nvPr>
+        </p:nvSpPr>
+        <p:spPr>
+          <a:xfrm>
+            <a:off x="0" y="0"/>
+            <a:ext cx="12192000" cy="6858000"/>
+          </a:xfrm>
+          <a:prstGeom prst="rect">
+            <a:avLst/>
+          </a:prstGeom>
+          <a:solidFill>
+            <a:schemeClr val="tx1"/>
+          </a:solidFill>
+          <a:ln w="12700" cap="flat" cmpd="sng" algn="ctr">
+            <a:noFill/>
+            <a:prstDash val="solid"/>
+            <a:miter lim="800000"/>
+          </a:ln>
+          <a:effectLst/>
+        </p:spPr>
+        <p:style>
+          <a:lnRef idx="2">
+            <a:schemeClr val="accent1">
+              <a:shade val="50000"/>
+            </a:schemeClr>
+          </a:lnRef>
+          <a:fillRef idx="1">
+            <a:schemeClr val="accent1"/>
+          </a:fillRef>
+          <a:effectRef idx="0">
+            <a:schemeClr val="accent1"/>
+          </a:effectRef>
+          <a:fontRef idx="minor">
+            <a:schemeClr val="lt1"/>
+          </a:fontRef>
+        </p:style>
+        <p:txBody>
+          <a:bodyPr rtlCol="0" anchor="ctr"/>
+          <a:lstStyle/>
+          <a:p>
+            <a:pPr algn="ctr"/>
+            <a:endParaRPr lang="en-US"/>
+          </a:p>
+        </p:txBody>
+      </p:sp>
+      <p:sp>
+        <p:nvSpPr>
+          <p:cNvPr id="2" name="Title 1">
+            <a:extLst>
+              <a:ext uri="{FF2B5EF4-FFF2-40B4-BE49-F238E27FC236}">
+                <a16:creationId xmlns:a16="http://schemas.microsoft.com/office/drawing/2014/main" id="{5D82EFF9-F23E-F996-66F6-0B43DAA1A39F}"/>
+              </a:ext>
+            </a:extLst>
+          </p:cNvPr>
+          <p:cNvSpPr>
+            <a:spLocks noGrp="1"/>
+          </p:cNvSpPr>
+          <p:nvPr>
+            <p:ph type="title"/>
+          </p:nvPr>
+        </p:nvSpPr>
+        <p:spPr>
+          <a:xfrm>
+            <a:off x="838200" y="1641752"/>
+            <a:ext cx="6143625" cy="1323439"/>
+          </a:xfrm>
+        </p:spPr>
+        <p:txBody>
+          <a:bodyPr anchor="t">
+            <a:normAutofit/>
+          </a:bodyPr>
+          <a:lstStyle/>
+          <a:p>
+            <a:r>
+              <a:rPr lang="en-US" sz="4000">
+                <a:solidFill>
+                  <a:schemeClr val="bg1"/>
+                </a:solidFill>
+              </a:rPr>
+              <a:t>‘Fake example using real publication’</a:t>
+            </a:r>
+            <a:endParaRPr lang="en-GB" sz="4000">
+              <a:solidFill>
+                <a:schemeClr val="bg1"/>
+              </a:solidFill>
+            </a:endParaRPr>
+          </a:p>
+        </p:txBody>
+      </p:sp>
+      <p:sp>
+        <p:nvSpPr>
+          <p:cNvPr id="3" name="Content Placeholder 2">
+            <a:extLst>
+              <a:ext uri="{FF2B5EF4-FFF2-40B4-BE49-F238E27FC236}">
+                <a16:creationId xmlns:a16="http://schemas.microsoft.com/office/drawing/2014/main" id="{756671E1-0A7C-76B9-ADD7-218778586A19}"/>
+              </a:ext>
+            </a:extLst>
+          </p:cNvPr>
+          <p:cNvSpPr>
+            <a:spLocks noGrp="1"/>
+          </p:cNvSpPr>
+          <p:nvPr>
+            <p:ph idx="1"/>
+          </p:nvPr>
+        </p:nvSpPr>
+        <p:spPr>
+          <a:xfrm>
+            <a:off x="838200" y="3146400"/>
+            <a:ext cx="6143625" cy="2454300"/>
+          </a:xfrm>
+        </p:spPr>
+        <p:txBody>
+          <a:bodyPr>
+            <a:normAutofit/>
+          </a:bodyPr>
+          <a:lstStyle/>
+          <a:p>
+            <a:r>
+              <a:rPr lang="en-US" sz="2400">
+                <a:solidFill>
+                  <a:schemeClr val="bg1">
+                    <a:alpha val="80000"/>
+                  </a:schemeClr>
+                </a:solidFill>
+              </a:rPr>
               <a:t>A psychometrics company wants to recruit sales people and use some tests to screen recruits</a:t>
             </a:r>
           </a:p>
           <a:p>
             <a:r>
-              <a:rPr lang="en-US" dirty="0"/>
+              <a:rPr lang="en-US" sz="2400">
+                <a:solidFill>
+                  <a:schemeClr val="bg1">
+                    <a:alpha val="80000"/>
+                  </a:schemeClr>
+                </a:solidFill>
+              </a:rPr>
               <a:t>They want people who will close sales</a:t>
             </a:r>
           </a:p>
           <a:p>
-            <a:endParaRPr lang="en-US" dirty="0"/>
-          </a:p>
-          <a:p>
-            <a:endParaRPr lang="en-GB" dirty="0"/>
+            <a:endParaRPr lang="en-US" sz="2400">
+              <a:solidFill>
+                <a:schemeClr val="bg1">
+                  <a:alpha val="80000"/>
+                </a:schemeClr>
+              </a:solidFill>
+            </a:endParaRPr>
+          </a:p>
+          <a:p>
+            <a:endParaRPr lang="en-GB" sz="2400">
+              <a:solidFill>
+                <a:schemeClr val="bg1">
+                  <a:alpha val="80000"/>
+                </a:schemeClr>
+              </a:solidFill>
+            </a:endParaRPr>
           </a:p>
         </p:txBody>
       </p:sp>
+      <p:pic>
+        <p:nvPicPr>
+          <p:cNvPr id="5" name="Picture 4">
+            <a:extLst>
+              <a:ext uri="{FF2B5EF4-FFF2-40B4-BE49-F238E27FC236}">
+                <a16:creationId xmlns:a16="http://schemas.microsoft.com/office/drawing/2014/main" id="{64FAC659-5086-4965-843D-F903B127DBE1}"/>
+              </a:ext>
+            </a:extLst>
+          </p:cNvPr>
+          <p:cNvPicPr>
+            <a:picLocks noChangeAspect="1"/>
+          </p:cNvPicPr>
+          <p:nvPr/>
+        </p:nvPicPr>
+        <p:blipFill>
+          <a:blip r:embed="rId2"/>
+          <a:stretch>
+            <a:fillRect/>
+          </a:stretch>
+        </p:blipFill>
+        <p:spPr>
+          <a:xfrm>
+            <a:off x="7859713" y="2336190"/>
+            <a:ext cx="3497262" cy="2146595"/>
+          </a:xfrm>
+          <a:prstGeom prst="rect">
+            <a:avLst/>
+          </a:prstGeom>
+        </p:spPr>
+      </p:pic>
     </p:spTree>
     <p:extLst>
       <p:ext uri="{BB962C8B-B14F-4D97-AF65-F5344CB8AC3E}">
@@ -5361,7 +5606,7 @@
 </p:sld>
 </file>
 
-<file path=ppt/slides/slide3.xml><?xml version="1.0" encoding="utf-8"?>
+<file path=ppt/slides/slide4.xml><?xml version="1.0" encoding="utf-8"?>
 <p:sld xmlns:a="http://schemas.openxmlformats.org/drawingml/2006/main" xmlns:r="http://schemas.openxmlformats.org/officeDocument/2006/relationships" xmlns:p="http://schemas.openxmlformats.org/presentationml/2006/main">
   <p:cSld>
     <p:spTree>
@@ -6022,6 +6267,97 @@
                       </p:childTnLst>
                     </p:cTn>
                   </p:par>
+                  <p:par>
+                    <p:cTn id="29" fill="hold">
+                      <p:stCondLst>
+                        <p:cond delay="indefinite"/>
+                      </p:stCondLst>
+                      <p:childTnLst>
+                        <p:par>
+                          <p:cTn id="30" fill="hold">
+                            <p:stCondLst>
+                              <p:cond delay="0"/>
+                            </p:stCondLst>
+                            <p:childTnLst>
+                              <p:par>
+                                <p:cTn id="31" presetID="2" presetClass="entr" presetSubtype="4" fill="hold" grpId="0" nodeType="clickEffect">
+                                  <p:stCondLst>
+                                    <p:cond delay="0"/>
+                                  </p:stCondLst>
+                                  <p:childTnLst>
+                                    <p:set>
+                                      <p:cBhvr>
+                                        <p:cTn id="32" dur="1" fill="hold">
+                                          <p:stCondLst>
+                                            <p:cond delay="0"/>
+                                          </p:stCondLst>
+                                        </p:cTn>
+                                        <p:tgtEl>
+                                          <p:spTgt spid="12"/>
+                                        </p:tgtEl>
+                                        <p:attrNameLst>
+                                          <p:attrName>style.visibility</p:attrName>
+                                        </p:attrNameLst>
+                                      </p:cBhvr>
+                                      <p:to>
+                                        <p:strVal val="visible"/>
+                                      </p:to>
+                                    </p:set>
+                                    <p:anim calcmode="lin" valueType="num">
+                                      <p:cBhvr additive="base">
+                                        <p:cTn id="33" dur="500" fill="hold"/>
+                                        <p:tgtEl>
+                                          <p:spTgt spid="12"/>
+                                        </p:tgtEl>
+                                        <p:attrNameLst>
+                                          <p:attrName>ppt_x</p:attrName>
+                                        </p:attrNameLst>
+                                      </p:cBhvr>
+                                      <p:tavLst>
+                                        <p:tav tm="0">
+                                          <p:val>
+                                            <p:strVal val="#ppt_x"/>
+                                          </p:val>
+                                        </p:tav>
+                                        <p:tav tm="100000">
+                                          <p:val>
+                                            <p:strVal val="#ppt_x"/>
+                                          </p:val>
+                                        </p:tav>
+                                      </p:tavLst>
+                                    </p:anim>
+                                    <p:anim calcmode="lin" valueType="num">
+                                      <p:cBhvr additive="base">
+                                        <p:cTn id="34" dur="500" fill="hold"/>
+                                        <p:tgtEl>
+                                          <p:spTgt spid="12"/>
+                                        </p:tgtEl>
+                                        <p:attrNameLst>
+                                          <p:attrName>ppt_y</p:attrName>
+                                        </p:attrNameLst>
+                                      </p:cBhvr>
+                                      <p:tavLst>
+                                        <p:tav tm="0">
+                                          <p:val>
+                                            <p:strVal val="1+#ppt_h/2"/>
+                                          </p:val>
+                                        </p:tav>
+                                        <p:tav tm="100000">
+                                          <p:val>
+                                            <p:strVal val="#ppt_y"/>
+                                          </p:val>
+                                        </p:tav>
+                                      </p:tavLst>
+                                    </p:anim>
+                                  </p:childTnLst>
+                                </p:cTn>
+                              </p:par>
+                            </p:childTnLst>
+                          </p:cTn>
+                        </p:par>
+                      </p:childTnLst>
+                    </p:cTn>
+                  </p:par>
                 </p:childTnLst>
               </p:cTn>
               <p:prevCondLst>
@@ -6046,13 +6382,14 @@
     <p:bldLst>
       <p:bldP spid="10" grpId="0" animBg="1"/>
       <p:bldP spid="11" grpId="0" animBg="1"/>
+      <p:bldP spid="12" grpId="0" animBg="1"/>
       <p:bldP spid="13" grpId="0" animBg="1"/>
     </p:bldLst>
   </p:timing>
 </p:sld>
 </file>
 
-<file path=ppt/slides/slide4.xml><?xml version="1.0" encoding="utf-8"?>
+<file path=ppt/slides/slide5.xml><?xml version="1.0" encoding="utf-8"?>
 <p:sld xmlns:a="http://schemas.openxmlformats.org/drawingml/2006/main" xmlns:r="http://schemas.openxmlformats.org/officeDocument/2006/relationships" xmlns:p="http://schemas.openxmlformats.org/presentationml/2006/main">
   <p:cSld>
     <p:spTree>
@@ -8011,7 +8348,7 @@
 </p:sld>
 </file>
 
-<file path=ppt/slides/slide5.xml><?xml version="1.0" encoding="utf-8"?>
+<file path=ppt/slides/slide6.xml><?xml version="1.0" encoding="utf-8"?>
 <p:sld xmlns:a="http://schemas.openxmlformats.org/drawingml/2006/main" xmlns:r="http://schemas.openxmlformats.org/officeDocument/2006/relationships" xmlns:p="http://schemas.openxmlformats.org/presentationml/2006/main">
   <p:cSld>
     <p:spTree>
@@ -8232,9 +8569,489 @@
 </p:sld>
 </file>
 
-<file path=ppt/slides/slide6.xml><?xml version="1.0" encoding="utf-8"?>
+<file path=ppt/slides/slide7.xml><?xml version="1.0" encoding="utf-8"?>
 <p:sld xmlns:a="http://schemas.openxmlformats.org/drawingml/2006/main" xmlns:r="http://schemas.openxmlformats.org/officeDocument/2006/relationships" xmlns:p="http://schemas.openxmlformats.org/presentationml/2006/main">
   <p:cSld>
+    <p:bg>
+      <p:bgPr>
+        <a:solidFill>
+          <a:schemeClr val="bg1"/>
+        </a:solidFill>
+        <a:effectLst/>
+      </p:bgPr>
+    </p:bg>
+    <p:spTree>
+      <p:nvGrpSpPr>
+        <p:cNvPr id="1" name=""/>
+        <p:cNvGrpSpPr/>
+        <p:nvPr/>
+      </p:nvGrpSpPr>
+      <p:grpSpPr>
+        <a:xfrm>
+          <a:off x="0" y="0"/>
+          <a:ext cx="0" cy="0"/>
+          <a:chOff x="0" y="0"/>
+          <a:chExt cx="0" cy="0"/>
+        </a:xfrm>
+      </p:grpSpPr>
+      <p:sp useBgFill="1">
+        <p:nvSpPr>
+          <p:cNvPr id="1031" name="Rectangle 1030">
+            <a:extLst>
+              <a:ext uri="{FF2B5EF4-FFF2-40B4-BE49-F238E27FC236}">
+                <a16:creationId xmlns:a16="http://schemas.microsoft.com/office/drawing/2014/main" id="{9AA72BD9-2C5A-4EDC-931F-5AA08EACA0F3}"/>
+              </a:ext>
+              <a:ext uri="{C183D7F6-B498-43B3-948B-1728B52AA6E4}">
+                <adec:decorative xmlns:adec="http://schemas.microsoft.com/office/drawing/2017/decorative" val="1"/>
+              </a:ext>
+            </a:extLst>
+          </p:cNvPr>
+          <p:cNvSpPr>
+            <a:spLocks noGrp="1" noRot="1" noChangeAspect="1" noMove="1" noResize="1" noEditPoints="1" noAdjustHandles="1" noChangeArrowheads="1" noChangeShapeType="1" noTextEdit="1"/>
+          </p:cNvSpPr>
+          <p:nvPr>
+            <p:extLst>
+              <p:ext uri="{386F3935-93C4-4BCD-93E2-E3B085C9AB24}">
+                <p16:designElem xmlns:p16="http://schemas.microsoft.com/office/powerpoint/2015/main" val="1"/>
+              </p:ext>
+            </p:extLst>
+          </p:nvPr>
+        </p:nvSpPr>
+        <p:spPr>
+          <a:xfrm>
+            <a:off x="0" y="0"/>
+            <a:ext cx="12192000" cy="6858000"/>
+          </a:xfrm>
+          <a:prstGeom prst="rect">
+            <a:avLst/>
+          </a:prstGeom>
+          <a:ln>
+            <a:noFill/>
+          </a:ln>
+        </p:spPr>
+        <p:style>
+          <a:lnRef idx="2">
+            <a:schemeClr val="accent1">
+              <a:shade val="50000"/>
+            </a:schemeClr>
+          </a:lnRef>
+          <a:fillRef idx="1">
+            <a:schemeClr val="accent1"/>
+          </a:fillRef>
+          <a:effectRef idx="0">
+            <a:schemeClr val="accent1"/>
+          </a:effectRef>
+          <a:fontRef idx="minor">
+            <a:schemeClr val="lt1"/>
+          </a:fontRef>
+        </p:style>
+        <p:txBody>
+          <a:bodyPr rtlCol="0" anchor="ctr"/>
+          <a:lstStyle/>
+          <a:p>
+            <a:pPr algn="ctr"/>
+            <a:endParaRPr lang="en-US"/>
+          </a:p>
+        </p:txBody>
+      </p:sp>
+      <p:pic>
+        <p:nvPicPr>
+          <p:cNvPr id="1026" name="Picture 2" descr="I Simpson | FindBook">
+            <a:extLst>
+              <a:ext uri="{FF2B5EF4-FFF2-40B4-BE49-F238E27FC236}">
+                <a16:creationId xmlns:a16="http://schemas.microsoft.com/office/drawing/2014/main" id="{BF79D4A1-8BBB-3DC8-BE78-CA59E3977890}"/>
+              </a:ext>
+            </a:extLst>
+          </p:cNvPr>
+          <p:cNvPicPr>
+            <a:picLocks noChangeAspect="1" noChangeArrowheads="1"/>
+          </p:cNvPicPr>
+          <p:nvPr/>
+        </p:nvPicPr>
+        <p:blipFill rotWithShape="1">
+          <a:blip r:embed="rId2">
+            <a:extLst>
+              <a:ext uri="{28A0092B-C50C-407E-A947-70E740481C1C}">
+                <a14:useLocalDpi xmlns:a14="http://schemas.microsoft.com/office/drawing/2010/main" val="0"/>
+              </a:ext>
+            </a:extLst>
+          </a:blip>
+          <a:srcRect l="3499" t="9091" r="31857"/>
+          <a:stretch/>
+        </p:blipFill>
+        <p:spPr bwMode="auto">
+          <a:xfrm>
+            <a:off x="3522468" y="10"/>
+            <a:ext cx="8669532" cy="6857990"/>
+          </a:xfrm>
+          <a:prstGeom prst="rect">
+            <a:avLst/>
+          </a:prstGeom>
+          <a:noFill/>
+          <a:extLst>
+            <a:ext uri="{909E8E84-426E-40DD-AFC4-6F175D3DCCD1}">
+              <a14:hiddenFill xmlns:a14="http://schemas.microsoft.com/office/drawing/2010/main">
+                <a:solidFill>
+                  <a:srgbClr val="FFFFFF"/>
+                </a:solidFill>
+              </a14:hiddenFill>
+            </a:ext>
+          </a:extLst>
+        </p:spPr>
+      </p:pic>
+      <p:sp>
+        <p:nvSpPr>
+          <p:cNvPr id="1033" name="Rectangle 1032">
+            <a:extLst>
+              <a:ext uri="{FF2B5EF4-FFF2-40B4-BE49-F238E27FC236}">
+                <a16:creationId xmlns:a16="http://schemas.microsoft.com/office/drawing/2014/main" id="{DD3981AC-7B61-4947-BCF3-F7AA7FA385B9}"/>
+              </a:ext>
+              <a:ext uri="{C183D7F6-B498-43B3-948B-1728B52AA6E4}">
+                <adec:decorative xmlns:adec="http://schemas.microsoft.com/office/drawing/2017/decorative" val="1"/>
+              </a:ext>
+            </a:extLst>
+          </p:cNvPr>
+          <p:cNvSpPr>
+            <a:spLocks noGrp="1" noRot="1" noChangeAspect="1" noMove="1" noResize="1" noEditPoints="1" noAdjustHandles="1" noChangeArrowheads="1" noChangeShapeType="1" noTextEdit="1"/>
+          </p:cNvSpPr>
+          <p:nvPr>
+            <p:extLst>
+              <p:ext uri="{386F3935-93C4-4BCD-93E2-E3B085C9AB24}">
+                <p16:designElem xmlns:p16="http://schemas.microsoft.com/office/powerpoint/2015/main" val="1"/>
+              </p:ext>
+            </p:extLst>
+          </p:nvPr>
+        </p:nvSpPr>
+        <p:spPr>
+          <a:xfrm>
+            <a:off x="2" y="0"/>
+            <a:ext cx="9756601" cy="6858000"/>
+          </a:xfrm>
+          <a:prstGeom prst="rect">
+            <a:avLst/>
+          </a:prstGeom>
+          <a:gradFill>
+            <a:gsLst>
+              <a:gs pos="58000">
+                <a:schemeClr val="bg1"/>
+              </a:gs>
+              <a:gs pos="35000">
+                <a:schemeClr val="bg1">
+                  <a:alpha val="78000"/>
+                </a:schemeClr>
+              </a:gs>
+              <a:gs pos="19000">
+                <a:schemeClr val="bg1">
+                  <a:alpha val="38000"/>
+                </a:schemeClr>
+              </a:gs>
+              <a:gs pos="0">
+                <a:schemeClr val="bg1">
+                  <a:alpha val="0"/>
+                </a:schemeClr>
+              </a:gs>
+              <a:gs pos="100000">
+                <a:schemeClr val="bg1"/>
+              </a:gs>
+            </a:gsLst>
+            <a:lin ang="10800000" scaled="0"/>
+          </a:gradFill>
+          <a:ln>
+            <a:noFill/>
+          </a:ln>
+        </p:spPr>
+        <p:style>
+          <a:lnRef idx="2">
+            <a:schemeClr val="accent1">
+              <a:shade val="50000"/>
+            </a:schemeClr>
+          </a:lnRef>
+          <a:fillRef idx="1">
+            <a:schemeClr val="accent1"/>
+          </a:fillRef>
+          <a:effectRef idx="0">
+            <a:schemeClr val="accent1"/>
+          </a:effectRef>
+          <a:fontRef idx="minor">
+            <a:schemeClr val="lt1"/>
+          </a:fontRef>
+        </p:style>
+        <p:txBody>
+          <a:bodyPr rtlCol="0" anchor="ctr"/>
+          <a:lstStyle/>
+          <a:p>
+            <a:pPr algn="ctr"/>
+            <a:endParaRPr lang="en-US" dirty="0"/>
+          </a:p>
+        </p:txBody>
+      </p:sp>
+      <p:sp>
+        <p:nvSpPr>
+          <p:cNvPr id="2" name="Title 1">
+            <a:extLst>
+              <a:ext uri="{FF2B5EF4-FFF2-40B4-BE49-F238E27FC236}">
+                <a16:creationId xmlns:a16="http://schemas.microsoft.com/office/drawing/2014/main" id="{694C8A94-86FF-6371-3CB7-C36DC060BD97}"/>
+              </a:ext>
+            </a:extLst>
+          </p:cNvPr>
+          <p:cNvSpPr>
+            <a:spLocks noGrp="1"/>
+          </p:cNvSpPr>
+          <p:nvPr>
+            <p:ph type="title"/>
+          </p:nvPr>
+        </p:nvSpPr>
+        <p:spPr>
+          <a:xfrm>
+            <a:off x="371094" y="1161288"/>
+            <a:ext cx="3438144" cy="1124712"/>
+          </a:xfrm>
+        </p:spPr>
+        <p:txBody>
+          <a:bodyPr anchor="b">
+            <a:normAutofit/>
+          </a:bodyPr>
+          <a:lstStyle/>
+          <a:p>
+            <a:r>
+              <a:rPr lang="en-US" sz="2800"/>
+              <a:t>Example</a:t>
+            </a:r>
+            <a:endParaRPr lang="en-GB" sz="2800"/>
+          </a:p>
+        </p:txBody>
+      </p:sp>
+      <p:sp>
+        <p:nvSpPr>
+          <p:cNvPr id="1035" name="Rectangle 1034">
+            <a:extLst>
+              <a:ext uri="{FF2B5EF4-FFF2-40B4-BE49-F238E27FC236}">
+                <a16:creationId xmlns:a16="http://schemas.microsoft.com/office/drawing/2014/main" id="{55D4142C-5077-457F-A6AD-3FECFDB39685}"/>
+              </a:ext>
+              <a:ext uri="{C183D7F6-B498-43B3-948B-1728B52AA6E4}">
+                <adec:decorative xmlns:adec="http://schemas.microsoft.com/office/drawing/2017/decorative" val="1"/>
+              </a:ext>
+            </a:extLst>
+          </p:cNvPr>
+          <p:cNvSpPr>
+            <a:spLocks noGrp="1" noRot="1" noChangeAspect="1" noMove="1" noResize="1" noEditPoints="1" noAdjustHandles="1" noChangeArrowheads="1" noChangeShapeType="1" noTextEdit="1"/>
+          </p:cNvSpPr>
+          <p:nvPr>
+            <p:extLst>
+              <p:ext uri="{386F3935-93C4-4BCD-93E2-E3B085C9AB24}">
+                <p16:designElem xmlns:p16="http://schemas.microsoft.com/office/powerpoint/2015/main" val="1"/>
+              </p:ext>
+            </p:extLst>
+          </p:nvPr>
+        </p:nvSpPr>
+        <p:spPr>
+          <a:xfrm rot="5400000">
+            <a:off x="662559" y="605790"/>
+            <a:ext cx="73152" cy="548640"/>
+          </a:xfrm>
+          <a:prstGeom prst="rect">
+            <a:avLst/>
+          </a:prstGeom>
+          <a:solidFill>
+            <a:schemeClr val="accent2"/>
+          </a:solidFill>
+          <a:ln>
+            <a:noFill/>
+          </a:ln>
+        </p:spPr>
+        <p:style>
+          <a:lnRef idx="2">
+            <a:schemeClr val="accent1">
+              <a:shade val="50000"/>
+            </a:schemeClr>
+          </a:lnRef>
+          <a:fillRef idx="1">
+            <a:schemeClr val="accent1"/>
+          </a:fillRef>
+          <a:effectRef idx="0">
+            <a:schemeClr val="accent1"/>
+          </a:effectRef>
+          <a:fontRef idx="minor">
+            <a:schemeClr val="lt1"/>
+          </a:fontRef>
+        </p:style>
+        <p:txBody>
+          <a:bodyPr rtlCol="0" anchor="ctr"/>
+          <a:lstStyle/>
+          <a:p>
+            <a:pPr algn="ctr"/>
+            <a:endParaRPr lang="en-US">
+              <a:solidFill>
+                <a:prstClr val="white"/>
+              </a:solidFill>
+              <a:latin typeface="Calibri" panose="020F0502020204030204"/>
+            </a:endParaRPr>
+          </a:p>
+        </p:txBody>
+      </p:sp>
+      <p:sp>
+        <p:nvSpPr>
+          <p:cNvPr id="1037" name="Rectangle 1036">
+            <a:extLst>
+              <a:ext uri="{FF2B5EF4-FFF2-40B4-BE49-F238E27FC236}">
+                <a16:creationId xmlns:a16="http://schemas.microsoft.com/office/drawing/2014/main" id="{7A5F0580-5EE9-419F-96EE-B6529EF6E7D0}"/>
+              </a:ext>
+              <a:ext uri="{C183D7F6-B498-43B3-948B-1728B52AA6E4}">
+                <adec:decorative xmlns:adec="http://schemas.microsoft.com/office/drawing/2017/decorative" val="1"/>
+              </a:ext>
+            </a:extLst>
+          </p:cNvPr>
+          <p:cNvSpPr>
+            <a:spLocks noGrp="1" noRot="1" noChangeAspect="1" noMove="1" noResize="1" noEditPoints="1" noAdjustHandles="1" noChangeArrowheads="1" noChangeShapeType="1" noTextEdit="1"/>
+          </p:cNvSpPr>
+          <p:nvPr>
+            <p:extLst>
+              <p:ext uri="{386F3935-93C4-4BCD-93E2-E3B085C9AB24}">
+                <p16:designElem xmlns:p16="http://schemas.microsoft.com/office/powerpoint/2015/main" val="1"/>
+              </p:ext>
+            </p:extLst>
+          </p:nvPr>
+        </p:nvSpPr>
+        <p:spPr>
+          <a:xfrm>
+            <a:off x="428244" y="2443480"/>
+            <a:ext cx="3300984" cy="18288"/>
+          </a:xfrm>
+          <a:prstGeom prst="rect">
+            <a:avLst/>
+          </a:prstGeom>
+          <a:solidFill>
+            <a:schemeClr val="tx1"/>
+          </a:solidFill>
+          <a:ln w="3175">
+            <a:noFill/>
+          </a:ln>
+          <a:effectLst/>
+        </p:spPr>
+        <p:style>
+          <a:lnRef idx="2">
+            <a:schemeClr val="accent1">
+              <a:shade val="50000"/>
+            </a:schemeClr>
+          </a:lnRef>
+          <a:fillRef idx="1">
+            <a:schemeClr val="accent1"/>
+          </a:fillRef>
+          <a:effectRef idx="0">
+            <a:schemeClr val="accent1"/>
+          </a:effectRef>
+          <a:fontRef idx="minor">
+            <a:schemeClr val="lt1"/>
+          </a:fontRef>
+        </p:style>
+        <p:txBody>
+          <a:bodyPr rtlCol="0" anchor="ctr"/>
+          <a:lstStyle/>
+          <a:p>
+            <a:pPr marL="0" marR="0" lvl="0" indent="0" algn="ctr" defTabSz="914400" rtl="0" eaLnBrk="1" fontAlgn="auto" latinLnBrk="0" hangingPunct="1">
+              <a:lnSpc>
+                <a:spcPct val="100000"/>
+              </a:lnSpc>
+              <a:spcBef>
+                <a:spcPts val="0"/>
+              </a:spcBef>
+              <a:spcAft>
+                <a:spcPts val="0"/>
+              </a:spcAft>
+              <a:buClrTx/>
+              <a:buSzTx/>
+              <a:buFontTx/>
+              <a:buNone/>
+              <a:tabLst/>
+              <a:defRPr/>
+            </a:pPr>
+            <a:endParaRPr kumimoji="0" lang="en-US" sz="1800" b="0" i="0" u="none" strike="noStrike" kern="1200" cap="none" spc="0" normalizeH="0" baseline="0" noProof="0">
+              <a:ln>
+                <a:noFill/>
+              </a:ln>
+              <a:solidFill>
+                <a:prstClr val="white"/>
+              </a:solidFill>
+              <a:effectLst/>
+              <a:uLnTx/>
+              <a:uFillTx/>
+              <a:latin typeface="Calibri" panose="020F0502020204030204"/>
+              <a:ea typeface="+mn-ea"/>
+              <a:cs typeface="+mn-cs"/>
+            </a:endParaRPr>
+          </a:p>
+        </p:txBody>
+      </p:sp>
+      <p:sp>
+        <p:nvSpPr>
+          <p:cNvPr id="3" name="Content Placeholder 2">
+            <a:extLst>
+              <a:ext uri="{FF2B5EF4-FFF2-40B4-BE49-F238E27FC236}">
+                <a16:creationId xmlns:a16="http://schemas.microsoft.com/office/drawing/2014/main" id="{0D331EA0-3F14-8FDC-B07D-9AAEF164AEC5}"/>
+              </a:ext>
+            </a:extLst>
+          </p:cNvPr>
+          <p:cNvSpPr>
+            <a:spLocks noGrp="1"/>
+          </p:cNvSpPr>
+          <p:nvPr>
+            <p:ph idx="1"/>
+          </p:nvPr>
+        </p:nvSpPr>
+        <p:spPr>
+          <a:xfrm>
+            <a:off x="371094" y="2718054"/>
+            <a:ext cx="3438906" cy="3207258"/>
+          </a:xfrm>
+        </p:spPr>
+        <p:txBody>
+          <a:bodyPr anchor="t">
+            <a:normAutofit/>
+          </a:bodyPr>
+          <a:lstStyle/>
+          <a:p>
+            <a:r>
+              <a:rPr lang="en-US" sz="1700" dirty="0"/>
+              <a:t>Someone who scores high on the  </a:t>
+            </a:r>
+            <a:r>
+              <a:rPr lang="en-US" sz="1700" dirty="0" err="1"/>
+              <a:t>Dormaus</a:t>
+            </a:r>
+            <a:r>
+              <a:rPr lang="en-US" sz="1700" dirty="0"/>
+              <a:t> attribute is more likely to be found sleeping on the job!</a:t>
+            </a:r>
+          </a:p>
+          <a:p>
+            <a:endParaRPr lang="en-GB" sz="1700" dirty="0"/>
+          </a:p>
+        </p:txBody>
+      </p:sp>
+    </p:spTree>
+    <p:extLst>
+      <p:ext uri="{BB962C8B-B14F-4D97-AF65-F5344CB8AC3E}">
+        <p14:creationId xmlns:p14="http://schemas.microsoft.com/office/powerpoint/2010/main" val="4197577056"/>
+      </p:ext>
+    </p:extLst>
+  </p:cSld>
+  <p:clrMapOvr>
+    <a:overrideClrMapping bg1="dk1" tx1="lt1" bg2="dk2" tx2="lt2" accent1="accent1" accent2="accent2" accent3="accent3" accent4="accent4" accent5="accent5" accent6="accent6" hlink="hlink" folHlink="folHlink"/>
+  </p:clrMapOvr>
+</p:sld>
+</file>
+
+<file path=ppt/slides/slide8.xml><?xml version="1.0" encoding="utf-8"?>
+<p:sld xmlns:a="http://schemas.openxmlformats.org/drawingml/2006/main" xmlns:r="http://schemas.openxmlformats.org/officeDocument/2006/relationships" xmlns:p="http://schemas.openxmlformats.org/presentationml/2006/main">
+  <p:cSld>
+    <p:bg>
+      <p:bgPr>
+        <a:solidFill>
+          <a:srgbClr val="000000"/>
+        </a:solidFill>
+        <a:effectLst/>
+      </p:bgPr>
+    </p:bg>
     <p:spTree>
       <p:nvGrpSpPr>
         <p:cNvPr id="1" name=""/>
@@ -8251,10 +9068,104 @@
       </p:grpSpPr>
       <p:sp>
         <p:nvSpPr>
+          <p:cNvPr id="10" name="Rectangle 9">
+            <a:extLst>
+              <a:ext uri="{FF2B5EF4-FFF2-40B4-BE49-F238E27FC236}">
+                <a16:creationId xmlns:a16="http://schemas.microsoft.com/office/drawing/2014/main" id="{71B2258F-86CA-4D4D-8270-BC05FCDEBFB3}"/>
+              </a:ext>
+              <a:ext uri="{C183D7F6-B498-43B3-948B-1728B52AA6E4}">
+                <adec:decorative xmlns:adec="http://schemas.microsoft.com/office/drawing/2017/decorative" val="1"/>
+              </a:ext>
+            </a:extLst>
+          </p:cNvPr>
+          <p:cNvSpPr>
+            <a:spLocks noGrp="1" noRot="1" noChangeAspect="1" noMove="1" noResize="1" noEditPoints="1" noAdjustHandles="1" noChangeArrowheads="1" noChangeShapeType="1" noTextEdit="1"/>
+          </p:cNvSpPr>
+          <p:nvPr>
+            <p:extLst>
+              <p:ext uri="{386F3935-93C4-4BCD-93E2-E3B085C9AB24}">
+                <p16:designElem xmlns:p16="http://schemas.microsoft.com/office/powerpoint/2015/main" val="1"/>
+              </p:ext>
+            </p:extLst>
+          </p:nvPr>
+        </p:nvSpPr>
+        <p:spPr>
+          <a:xfrm>
+            <a:off x="0" y="0"/>
+            <a:ext cx="12192000" cy="6857999"/>
+          </a:xfrm>
+          <a:prstGeom prst="rect">
+            <a:avLst/>
+          </a:prstGeom>
+          <a:solidFill>
+            <a:srgbClr val="000000"/>
+          </a:solidFill>
+          <a:ln>
+            <a:noFill/>
+          </a:ln>
+        </p:spPr>
+        <p:style>
+          <a:lnRef idx="2">
+            <a:schemeClr val="accent1">
+              <a:shade val="50000"/>
+            </a:schemeClr>
+          </a:lnRef>
+          <a:fillRef idx="1">
+            <a:schemeClr val="accent1"/>
+          </a:fillRef>
+          <a:effectRef idx="0">
+            <a:schemeClr val="accent1"/>
+          </a:effectRef>
+          <a:fontRef idx="minor">
+            <a:schemeClr val="lt1"/>
+          </a:fontRef>
+        </p:style>
+        <p:txBody>
+          <a:bodyPr rtlCol="0" anchor="ctr"/>
+          <a:lstStyle/>
+          <a:p>
+            <a:pPr algn="ctr"/>
+            <a:endParaRPr lang="en-US"/>
+          </a:p>
+        </p:txBody>
+      </p:sp>
+      <p:pic>
+        <p:nvPicPr>
+          <p:cNvPr id="5" name="Picture 4">
+            <a:extLst>
+              <a:ext uri="{FF2B5EF4-FFF2-40B4-BE49-F238E27FC236}">
+                <a16:creationId xmlns:a16="http://schemas.microsoft.com/office/drawing/2014/main" id="{D6E5ED52-AEA2-6664-C916-883B4FFA2FE8}"/>
+              </a:ext>
+            </a:extLst>
+          </p:cNvPr>
+          <p:cNvPicPr>
+            <a:picLocks noChangeAspect="1"/>
+          </p:cNvPicPr>
+          <p:nvPr/>
+        </p:nvPicPr>
+        <p:blipFill rotWithShape="1">
+          <a:blip r:embed="rId2">
+            <a:alphaModFix amt="50000"/>
+          </a:blip>
+          <a:srcRect b="3017"/>
+          <a:stretch/>
+        </p:blipFill>
+        <p:spPr>
+          <a:xfrm>
+            <a:off x="20" y="1"/>
+            <a:ext cx="12191980" cy="6857999"/>
+          </a:xfrm>
+          <a:prstGeom prst="rect">
+            <a:avLst/>
+          </a:prstGeom>
+        </p:spPr>
+      </p:pic>
+      <p:sp>
+        <p:nvSpPr>
           <p:cNvPr id="2" name="Title 1">
             <a:extLst>
               <a:ext uri="{FF2B5EF4-FFF2-40B4-BE49-F238E27FC236}">
-                <a16:creationId xmlns:a16="http://schemas.microsoft.com/office/drawing/2014/main" id="{694C8A94-86FF-6371-3CB7-C36DC060BD97}"/>
+                <a16:creationId xmlns:a16="http://schemas.microsoft.com/office/drawing/2014/main" id="{212660E4-85ED-DA58-4EFB-F95C822439D4}"/>
               </a:ext>
             </a:extLst>
           </p:cNvPr>
@@ -8265,16 +9176,27 @@
             <p:ph type="title"/>
           </p:nvPr>
         </p:nvSpPr>
-        <p:spPr/>
+        <p:spPr>
+          <a:xfrm>
+            <a:off x="1524000" y="1122362"/>
+            <a:ext cx="9144000" cy="2900518"/>
+          </a:xfrm>
+        </p:spPr>
         <p:txBody>
-          <a:bodyPr/>
+          <a:bodyPr vert="horz" lIns="91440" tIns="45720" rIns="91440" bIns="45720" rtlCol="0" anchor="b">
+            <a:normAutofit/>
+          </a:bodyPr>
           <a:lstStyle/>
           <a:p>
+            <a:pPr algn="ctr"/>
             <a:r>
-              <a:rPr lang="en-US" dirty="0"/>
-              <a:t>Example</a:t>
+              <a:rPr lang="en-US" sz="6000">
+                <a:solidFill>
+                  <a:srgbClr val="FFFFFF"/>
+                </a:solidFill>
+              </a:rPr>
+              <a:t>Task</a:t>
             </a:r>
-            <a:endParaRPr lang="en-GB" dirty="0"/>
           </a:p>
         </p:txBody>
       </p:sp>
@@ -8283,7 +9205,7 @@
           <p:cNvPr id="3" name="Content Placeholder 2">
             <a:extLst>
               <a:ext uri="{FF2B5EF4-FFF2-40B4-BE49-F238E27FC236}">
-                <a16:creationId xmlns:a16="http://schemas.microsoft.com/office/drawing/2014/main" id="{0D331EA0-3F14-8FDC-B07D-9AAEF164AEC5}"/>
+                <a16:creationId xmlns:a16="http://schemas.microsoft.com/office/drawing/2014/main" id="{BE9D0ABF-BAA1-3F33-B527-636FC7632428}"/>
               </a:ext>
             </a:extLst>
           </p:cNvPr>
@@ -8294,114 +9216,29 @@
             <p:ph idx="1"/>
           </p:nvPr>
         </p:nvSpPr>
-        <p:spPr/>
+        <p:spPr>
+          <a:xfrm>
+            <a:off x="1524000" y="4159404"/>
+            <a:ext cx="9144000" cy="1098395"/>
+          </a:xfrm>
+        </p:spPr>
         <p:txBody>
-          <a:bodyPr/>
+          <a:bodyPr vert="horz" lIns="91440" tIns="45720" rIns="91440" bIns="45720" rtlCol="0">
+            <a:normAutofit/>
+          </a:bodyPr>
           <a:lstStyle/>
           <a:p>
+            <a:pPr marL="0" indent="0" algn="ctr">
+              <a:buNone/>
+            </a:pPr>
             <a:r>
-              <a:rPr lang="en-US" dirty="0"/>
-              <a:t>Someone who scores high on </a:t>
-            </a:r>
-            <a:r>
-              <a:rPr lang="en-US" dirty="0" err="1"/>
-              <a:t>Dormaus</a:t>
-            </a:r>
-            <a:r>
-              <a:rPr lang="en-US" dirty="0"/>
-              <a:t> is more likely to be found sleeping on the job!</a:t>
-            </a:r>
-          </a:p>
-          <a:p>
-            <a:endParaRPr lang="en-GB" dirty="0"/>
-          </a:p>
-        </p:txBody>
-      </p:sp>
-    </p:spTree>
-    <p:extLst>
-      <p:ext uri="{BB962C8B-B14F-4D97-AF65-F5344CB8AC3E}">
-        <p14:creationId xmlns:p14="http://schemas.microsoft.com/office/powerpoint/2010/main" val="4197577056"/>
-      </p:ext>
-    </p:extLst>
-  </p:cSld>
-  <p:clrMapOvr>
-    <a:masterClrMapping/>
-  </p:clrMapOvr>
-</p:sld>
-</file>
-
-<file path=ppt/slides/slide7.xml><?xml version="1.0" encoding="utf-8"?>
-<p:sld xmlns:a="http://schemas.openxmlformats.org/drawingml/2006/main" xmlns:r="http://schemas.openxmlformats.org/officeDocument/2006/relationships" xmlns:p="http://schemas.openxmlformats.org/presentationml/2006/main">
-  <p:cSld>
-    <p:spTree>
-      <p:nvGrpSpPr>
-        <p:cNvPr id="1" name=""/>
-        <p:cNvGrpSpPr/>
-        <p:nvPr/>
-      </p:nvGrpSpPr>
-      <p:grpSpPr>
-        <a:xfrm>
-          <a:off x="0" y="0"/>
-          <a:ext cx="0" cy="0"/>
-          <a:chOff x="0" y="0"/>
-          <a:chExt cx="0" cy="0"/>
-        </a:xfrm>
-      </p:grpSpPr>
-      <p:sp>
-        <p:nvSpPr>
-          <p:cNvPr id="2" name="Title 1">
-            <a:extLst>
-              <a:ext uri="{FF2B5EF4-FFF2-40B4-BE49-F238E27FC236}">
-                <a16:creationId xmlns:a16="http://schemas.microsoft.com/office/drawing/2014/main" id="{212660E4-85ED-DA58-4EFB-F95C822439D4}"/>
-              </a:ext>
-            </a:extLst>
-          </p:cNvPr>
-          <p:cNvSpPr>
-            <a:spLocks noGrp="1"/>
-          </p:cNvSpPr>
-          <p:nvPr>
-            <p:ph type="title"/>
-          </p:nvPr>
-        </p:nvSpPr>
-        <p:spPr/>
-        <p:txBody>
-          <a:bodyPr/>
-          <a:lstStyle/>
-          <a:p>
-            <a:r>
-              <a:rPr lang="en-US" dirty="0"/>
-              <a:t>Task</a:t>
-            </a:r>
-            <a:endParaRPr lang="en-GB" dirty="0"/>
-          </a:p>
-        </p:txBody>
-      </p:sp>
-      <p:sp>
-        <p:nvSpPr>
-          <p:cNvPr id="3" name="Content Placeholder 2">
-            <a:extLst>
-              <a:ext uri="{FF2B5EF4-FFF2-40B4-BE49-F238E27FC236}">
-                <a16:creationId xmlns:a16="http://schemas.microsoft.com/office/drawing/2014/main" id="{BE9D0ABF-BAA1-3F33-B527-636FC7632428}"/>
-              </a:ext>
-            </a:extLst>
-          </p:cNvPr>
-          <p:cNvSpPr>
-            <a:spLocks noGrp="1"/>
-          </p:cNvSpPr>
-          <p:nvPr>
-            <p:ph idx="1"/>
-          </p:nvPr>
-        </p:nvSpPr>
-        <p:spPr/>
-        <p:txBody>
-          <a:bodyPr/>
-          <a:lstStyle/>
-          <a:p>
-            <a:r>
-              <a:rPr lang="en-US" dirty="0"/>
+              <a:rPr lang="en-US" sz="2400">
+                <a:solidFill>
+                  <a:srgbClr val="FFFFFF"/>
+                </a:solidFill>
+              </a:rPr>
               <a:t>Repeat this process with some of the other variables</a:t>
             </a:r>
-            <a:endParaRPr lang="en-GB" dirty="0"/>
           </a:p>
         </p:txBody>
       </p:sp>
@@ -8413,7 +9250,7 @@
     </p:extLst>
   </p:cSld>
   <p:clrMapOvr>
-    <a:masterClrMapping/>
+    <a:overrideClrMapping bg1="dk1" tx1="lt1" bg2="dk2" tx2="lt2" accent1="accent1" accent2="accent2" accent3="accent3" accent4="accent4" accent5="accent5" accent6="accent6" hlink="hlink" folHlink="folHlink"/>
   </p:clrMapOvr>
 </p:sld>
 </file>
@@ -9009,12 +9846,6 @@
 </file>
 
 <file path=customXml/item1.xml><?xml version="1.0" encoding="utf-8"?>
-<p:properties xmlns:p="http://schemas.microsoft.com/office/2006/metadata/properties" xmlns:xsi="http://www.w3.org/2001/XMLSchema-instance" xmlns:pc="http://schemas.microsoft.com/office/infopath/2007/PartnerControls">
-  <documentManagement/>
-</p:properties>
-</file>
-
-<file path=customXml/item2.xml><?xml version="1.0" encoding="utf-8"?>
 <ct:contentTypeSchema xmlns:ct="http://schemas.microsoft.com/office/2006/metadata/contentType" xmlns:ma="http://schemas.microsoft.com/office/2006/metadata/properties/metaAttributes" ct:_="" ma:_="" ma:contentTypeName="Document" ma:contentTypeID="0x010100A4D5B7CF51FD7D419C5CAA01758E47AC" ma:contentTypeVersion="13" ma:contentTypeDescription="Create a new document." ma:contentTypeScope="" ma:versionID="b64f38b3ec8a3619e5554203bfedb273">
   <xsd:schema xmlns:xsd="http://www.w3.org/2001/XMLSchema" xmlns:xs="http://www.w3.org/2001/XMLSchema" xmlns:p="http://schemas.microsoft.com/office/2006/metadata/properties" xmlns:ns2="22dc0c7b-222c-4368-9d25-b23c1c5625aa" xmlns:ns3="a544f5c6-c2b2-44cf-9139-519269434505" targetNamespace="http://schemas.microsoft.com/office/2006/metadata/properties" ma:root="true" ma:fieldsID="24a7b17ef24addfb07d34f978b6a18cc" ns2:_="" ns3:_="">
     <xsd:import namespace="22dc0c7b-222c-4368-9d25-b23c1c5625aa"/>
@@ -9237,6 +10068,12 @@
 </ct:contentTypeSchema>
 </file>
 
+<file path=customXml/item2.xml><?xml version="1.0" encoding="utf-8"?>
+<p:properties xmlns:p="http://schemas.microsoft.com/office/2006/metadata/properties" xmlns:xsi="http://www.w3.org/2001/XMLSchema-instance" xmlns:pc="http://schemas.microsoft.com/office/infopath/2007/PartnerControls">
+  <documentManagement/>
+</p:properties>
+</file>
+
 <file path=customXml/item3.xml><?xml version="1.0" encoding="utf-8"?>
 <?mso-contentType ?>
 <FormTemplates xmlns="http://schemas.microsoft.com/sharepoint/v3/contenttype/forms">
@@ -9247,23 +10084,6 @@
 </file>
 
 <file path=customXml/itemProps1.xml><?xml version="1.0" encoding="utf-8"?>
-<ds:datastoreItem xmlns:ds="http://schemas.openxmlformats.org/officeDocument/2006/customXml" ds:itemID="{167F5D9E-0077-4E09-B69C-7968FBCA2803}">
-  <ds:schemaRefs>
-    <ds:schemaRef ds:uri="http://purl.org/dc/dcmitype/"/>
-    <ds:schemaRef ds:uri="http://purl.org/dc/terms/"/>
-    <ds:schemaRef ds:uri="http://schemas.microsoft.com/office/2006/documentManagement/types"/>
-    <ds:schemaRef ds:uri="http://schemas.microsoft.com/office/infopath/2007/PartnerControls"/>
-    <ds:schemaRef ds:uri="http://www.w3.org/XML/1998/namespace"/>
-    <ds:schemaRef ds:uri="http://schemas.openxmlformats.org/package/2006/metadata/core-properties"/>
-    <ds:schemaRef ds:uri="http://schemas.microsoft.com/office/2006/metadata/properties"/>
-    <ds:schemaRef ds:uri="a544f5c6-c2b2-44cf-9139-519269434505"/>
-    <ds:schemaRef ds:uri="3450dea5-9c92-46d7-80ec-867c4bee000d"/>
-    <ds:schemaRef ds:uri="http://purl.org/dc/elements/1.1/"/>
-  </ds:schemaRefs>
-</ds:datastoreItem>
-</file>
-
-<file path=customXml/itemProps2.xml><?xml version="1.0" encoding="utf-8"?>
 <ds:datastoreItem xmlns:ds="http://schemas.openxmlformats.org/officeDocument/2006/customXml" ds:itemID="{7B46F19C-CB27-43DA-B94B-ABCCB11B7FFC}">
   <ds:schemaRefs>
     <ds:schemaRef ds:uri="http://schemas.microsoft.com/office/2006/metadata/contentType"/>
@@ -9282,6 +10102,23 @@
 </ds:datastoreItem>
 </file>
 
+<file path=customXml/itemProps2.xml><?xml version="1.0" encoding="utf-8"?>
+<ds:datastoreItem xmlns:ds="http://schemas.openxmlformats.org/officeDocument/2006/customXml" ds:itemID="{167F5D9E-0077-4E09-B69C-7968FBCA2803}">
+  <ds:schemaRefs>
+    <ds:schemaRef ds:uri="http://purl.org/dc/dcmitype/"/>
+    <ds:schemaRef ds:uri="http://purl.org/dc/terms/"/>
+    <ds:schemaRef ds:uri="http://schemas.microsoft.com/office/2006/documentManagement/types"/>
+    <ds:schemaRef ds:uri="http://schemas.microsoft.com/office/infopath/2007/PartnerControls"/>
+    <ds:schemaRef ds:uri="http://www.w3.org/XML/1998/namespace"/>
+    <ds:schemaRef ds:uri="http://schemas.openxmlformats.org/package/2006/metadata/core-properties"/>
+    <ds:schemaRef ds:uri="http://schemas.microsoft.com/office/2006/metadata/properties"/>
+    <ds:schemaRef ds:uri="a544f5c6-c2b2-44cf-9139-519269434505"/>
+    <ds:schemaRef ds:uri="3450dea5-9c92-46d7-80ec-867c4bee000d"/>
+    <ds:schemaRef ds:uri="http://purl.org/dc/elements/1.1/"/>
+  </ds:schemaRefs>
+</ds:datastoreItem>
+</file>
+
 <file path=customXml/itemProps3.xml><?xml version="1.0" encoding="utf-8"?>
 <ds:datastoreItem xmlns:ds="http://schemas.openxmlformats.org/officeDocument/2006/customXml" ds:itemID="{886969B4-F2F7-4F92-816F-BDBBA6D4D0D4}">
   <ds:schemaRefs>

</xml_diff>